<commit_message>
Add lesson4 and exercise4
</commit_message>
<xml_diff>
--- a/exercise1/Exercise_1.pptx
+++ b/exercise1/Exercise_1.pptx
@@ -23,35 +23,35 @@
   <p:notesSz cx="6858000" cy="9144000"/>
   <p:embeddedFontLst>
     <p:embeddedFont>
-      <p:font typeface="Microsoft YaHei" panose="020B0503020204020204" pitchFamily="34" charset="-122"/>
+      <p:font typeface="Microsoft YaHei UI" panose="020B0503020204020204" pitchFamily="34" charset="-122"/>
       <p:regular r:id="rId13"/>
       <p:bold r:id="rId14"/>
     </p:embeddedFont>
     <p:embeddedFont>
-      <p:font typeface="Calibri" panose="020F0502020204030204" pitchFamily="34" charset="0"/>
+      <p:font typeface="Nunito Sans" panose="020B0604020202020204" charset="0"/>
       <p:regular r:id="rId15"/>
       <p:bold r:id="rId16"/>
       <p:italic r:id="rId17"/>
       <p:boldItalic r:id="rId18"/>
     </p:embeddedFont>
     <p:embeddedFont>
-      <p:font typeface="Nunito Sans" panose="020B0604020202020204" charset="0"/>
+      <p:font typeface="Calibri" panose="020F0502020204030204" pitchFamily="34" charset="0"/>
       <p:regular r:id="rId19"/>
       <p:bold r:id="rId20"/>
       <p:italic r:id="rId21"/>
       <p:boldItalic r:id="rId22"/>
     </p:embeddedFont>
     <p:embeddedFont>
-      <p:font typeface="Georgia" panose="02040502050405020303" pitchFamily="18" charset="0"/>
+      <p:font typeface="Microsoft YaHei" panose="020B0503020204020204" pitchFamily="34" charset="-122"/>
       <p:regular r:id="rId23"/>
       <p:bold r:id="rId24"/>
-      <p:italic r:id="rId25"/>
-      <p:boldItalic r:id="rId26"/>
     </p:embeddedFont>
     <p:embeddedFont>
-      <p:font typeface="Microsoft YaHei UI" panose="020B0503020204020204" pitchFamily="34" charset="-122"/>
-      <p:regular r:id="rId27"/>
-      <p:bold r:id="rId28"/>
+      <p:font typeface="Georgia" panose="02040502050405020303" pitchFamily="18" charset="0"/>
+      <p:regular r:id="rId25"/>
+      <p:bold r:id="rId26"/>
+      <p:italic r:id="rId27"/>
+      <p:boldItalic r:id="rId28"/>
     </p:embeddedFont>
   </p:embeddedFontLst>
   <p:defaultTextStyle>
@@ -5038,10 +5038,6 @@
             <a:r>
               <a:rPr lang="en" dirty="0" smtClean="0"/>
               <a:t>OpCode </a:t>
-            </a:r>
-            <a:r>
-              <a:rPr lang="en" dirty="0" smtClean="0"/>
-              <a:t/>
             </a:r>
             <a:br>
               <a:rPr lang="en" dirty="0" smtClean="0"/>
@@ -6257,19 +6253,7 @@
               <a:rPr lang="en" sz="1050" dirty="0">
                 <a:sym typeface="Nunito Sans"/>
               </a:rPr>
-              <a:t>e.g</a:t>
-            </a:r>
-            <a:r>
-              <a:rPr lang="en" sz="1050" dirty="0">
-                <a:sym typeface="Nunito Sans"/>
-              </a:rPr>
-              <a:t>. </a:t>
-            </a:r>
-            <a:r>
-              <a:rPr lang="en" sz="1050" dirty="0">
-                <a:sym typeface="Nunito Sans"/>
-              </a:rPr>
-              <a:t>In Window, u</a:t>
+              <a:t>e.g. In Window, u</a:t>
             </a:r>
             <a:r>
               <a:rPr lang="it-IT" sz="1050" dirty="0">
@@ -6453,14 +6437,7 @@
                 <a:sym typeface="Nunito Sans"/>
                 <a:hlinkClick r:id="rId5"/>
               </a:rPr>
-              <a:t>https://www.python.org/downloads</a:t>
-            </a:r>
-            <a:r>
-              <a:rPr lang="it-IT" sz="1050" dirty="0">
-                <a:sym typeface="Nunito Sans"/>
-                <a:hlinkClick r:id="rId5"/>
-              </a:rPr>
-              <a:t>/</a:t>
+              <a:t>https://www.python.org/downloads/</a:t>
             </a:r>
             <a:r>
               <a:rPr lang="it-IT" sz="1050" dirty="0">
@@ -12181,7 +12158,7 @@
               <a:rPr lang="it-IT" dirty="0" smtClean="0">
                 <a:sym typeface="Nunito Sans"/>
               </a:rPr>
-              <a:t>DIB(first</a:t>
+              <a:t>DIV(first</a:t>
             </a:r>
             <a:r>
               <a:rPr lang="it-IT" dirty="0" smtClean="0">

</xml_diff>